<commit_message>
the last version of out presentation
</commit_message>
<xml_diff>
--- a/Презентация.pptx
+++ b/Презентация.pptx
@@ -7,8 +7,8 @@
   <p:sldIdLst>
     <p:sldId id="256" r:id="rId2"/>
     <p:sldId id="260" r:id="rId3"/>
-    <p:sldId id="261" r:id="rId4"/>
-    <p:sldId id="262" r:id="rId5"/>
+    <p:sldId id="262" r:id="rId4"/>
+    <p:sldId id="261" r:id="rId5"/>
     <p:sldId id="263" r:id="rId6"/>
     <p:sldId id="264" r:id="rId7"/>
     <p:sldId id="265" r:id="rId8"/>
@@ -4303,7 +4303,7 @@
         </p:nvSpPr>
         <p:spPr>
           <a:xfrm>
-            <a:off x="4374237" y="345347"/>
+            <a:off x="4021807" y="331956"/>
             <a:ext cx="10515600" cy="1325563"/>
           </a:xfrm>
         </p:spPr>
@@ -4366,8 +4366,8 @@
         </p:blipFill>
         <p:spPr>
           <a:xfrm>
-            <a:off x="884726" y="1763771"/>
-            <a:ext cx="2285714" cy="2031746"/>
+            <a:off x="399822" y="1756056"/>
+            <a:ext cx="1699757" cy="1510895"/>
           </a:xfrm>
           <a:prstGeom prst="rect">
             <a:avLst/>
@@ -4402,8 +4402,8 @@
         </p:blipFill>
         <p:spPr>
           <a:xfrm>
-            <a:off x="884726" y="4135910"/>
-            <a:ext cx="2285714" cy="2031746"/>
+            <a:off x="373193" y="3429000"/>
+            <a:ext cx="1699757" cy="1510895"/>
           </a:xfrm>
           <a:prstGeom prst="rect">
             <a:avLst/>
@@ -4412,10 +4412,10 @@
       </p:pic>
       <p:pic>
         <p:nvPicPr>
-          <p:cNvPr id="9" name="Рисунок 8">
-            <a:extLst>
-              <a:ext uri="{FF2B5EF4-FFF2-40B4-BE49-F238E27FC236}">
-                <a16:creationId xmlns:a16="http://schemas.microsoft.com/office/drawing/2014/main" id="{D6E3FD4E-534D-4BC0-AE7D-B7F5F6B78EB0}"/>
+          <p:cNvPr id="5" name="Рисунок 4">
+            <a:extLst>
+              <a:ext uri="{FF2B5EF4-FFF2-40B4-BE49-F238E27FC236}">
+                <a16:creationId xmlns:a16="http://schemas.microsoft.com/office/drawing/2014/main" id="{C5484D3D-863A-4F21-80C2-44D8EA338047}"/>
               </a:ext>
             </a:extLst>
           </p:cNvPr>
@@ -4438,8 +4438,332 @@
         </p:blipFill>
         <p:spPr>
           <a:xfrm>
-            <a:off x="5219142" y="1844516"/>
-            <a:ext cx="4981863" cy="3068775"/>
+            <a:off x="2322050" y="1763771"/>
+            <a:ext cx="1699757" cy="1510895"/>
+          </a:xfrm>
+          <a:prstGeom prst="rect">
+            <a:avLst/>
+          </a:prstGeom>
+        </p:spPr>
+      </p:pic>
+      <p:pic>
+        <p:nvPicPr>
+          <p:cNvPr id="8" name="Рисунок 7">
+            <a:extLst>
+              <a:ext uri="{FF2B5EF4-FFF2-40B4-BE49-F238E27FC236}">
+                <a16:creationId xmlns:a16="http://schemas.microsoft.com/office/drawing/2014/main" id="{AD8BC13A-393F-4EA4-BAA9-F2FBBE88CD55}"/>
+              </a:ext>
+            </a:extLst>
+          </p:cNvPr>
+          <p:cNvPicPr>
+            <a:picLocks noChangeAspect="1"/>
+          </p:cNvPicPr>
+          <p:nvPr/>
+        </p:nvPicPr>
+        <p:blipFill>
+          <a:blip r:embed="rId5">
+            <a:extLst>
+              <a:ext uri="{28A0092B-C50C-407E-A947-70E740481C1C}">
+                <a14:useLocalDpi xmlns:a14="http://schemas.microsoft.com/office/drawing/2010/main" val="0"/>
+              </a:ext>
+            </a:extLst>
+          </a:blip>
+          <a:stretch>
+            <a:fillRect/>
+          </a:stretch>
+        </p:blipFill>
+        <p:spPr>
+          <a:xfrm>
+            <a:off x="7884622" y="1795815"/>
+            <a:ext cx="1699757" cy="1510895"/>
+          </a:xfrm>
+          <a:prstGeom prst="rect">
+            <a:avLst/>
+          </a:prstGeom>
+        </p:spPr>
+      </p:pic>
+      <p:pic>
+        <p:nvPicPr>
+          <p:cNvPr id="11" name="Рисунок 10">
+            <a:extLst>
+              <a:ext uri="{FF2B5EF4-FFF2-40B4-BE49-F238E27FC236}">
+                <a16:creationId xmlns:a16="http://schemas.microsoft.com/office/drawing/2014/main" id="{B1C9C9F8-69CC-4000-9340-F141372D7B03}"/>
+              </a:ext>
+            </a:extLst>
+          </p:cNvPr>
+          <p:cNvPicPr>
+            <a:picLocks noChangeAspect="1"/>
+          </p:cNvPicPr>
+          <p:nvPr/>
+        </p:nvPicPr>
+        <p:blipFill>
+          <a:blip r:embed="rId6">
+            <a:extLst>
+              <a:ext uri="{28A0092B-C50C-407E-A947-70E740481C1C}">
+                <a14:useLocalDpi xmlns:a14="http://schemas.microsoft.com/office/drawing/2010/main" val="0"/>
+              </a:ext>
+            </a:extLst>
+          </a:blip>
+          <a:stretch>
+            <a:fillRect/>
+          </a:stretch>
+        </p:blipFill>
+        <p:spPr>
+          <a:xfrm>
+            <a:off x="2323160" y="3450110"/>
+            <a:ext cx="1666764" cy="1481568"/>
+          </a:xfrm>
+          <a:prstGeom prst="rect">
+            <a:avLst/>
+          </a:prstGeom>
+        </p:spPr>
+      </p:pic>
+      <p:pic>
+        <p:nvPicPr>
+          <p:cNvPr id="13" name="Рисунок 12">
+            <a:extLst>
+              <a:ext uri="{FF2B5EF4-FFF2-40B4-BE49-F238E27FC236}">
+                <a16:creationId xmlns:a16="http://schemas.microsoft.com/office/drawing/2014/main" id="{04A4CA0A-CB88-4A7C-984B-69D8A4827952}"/>
+              </a:ext>
+            </a:extLst>
+          </p:cNvPr>
+          <p:cNvPicPr>
+            <a:picLocks noChangeAspect="1"/>
+          </p:cNvPicPr>
+          <p:nvPr/>
+        </p:nvPicPr>
+        <p:blipFill>
+          <a:blip r:embed="rId7">
+            <a:extLst>
+              <a:ext uri="{28A0092B-C50C-407E-A947-70E740481C1C}">
+                <a14:useLocalDpi xmlns:a14="http://schemas.microsoft.com/office/drawing/2010/main" val="0"/>
+              </a:ext>
+            </a:extLst>
+          </a:blip>
+          <a:stretch>
+            <a:fillRect/>
+          </a:stretch>
+        </p:blipFill>
+        <p:spPr>
+          <a:xfrm>
+            <a:off x="4244822" y="3412261"/>
+            <a:ext cx="1709344" cy="1519417"/>
+          </a:xfrm>
+          <a:prstGeom prst="rect">
+            <a:avLst/>
+          </a:prstGeom>
+        </p:spPr>
+      </p:pic>
+      <p:pic>
+        <p:nvPicPr>
+          <p:cNvPr id="15" name="Рисунок 14">
+            <a:extLst>
+              <a:ext uri="{FF2B5EF4-FFF2-40B4-BE49-F238E27FC236}">
+                <a16:creationId xmlns:a16="http://schemas.microsoft.com/office/drawing/2014/main" id="{6E509B53-96F5-4806-B1E3-73FC5D2CC6CB}"/>
+              </a:ext>
+            </a:extLst>
+          </p:cNvPr>
+          <p:cNvPicPr>
+            <a:picLocks noChangeAspect="1"/>
+          </p:cNvPicPr>
+          <p:nvPr/>
+        </p:nvPicPr>
+        <p:blipFill>
+          <a:blip r:embed="rId8">
+            <a:extLst>
+              <a:ext uri="{28A0092B-C50C-407E-A947-70E740481C1C}">
+                <a14:useLocalDpi xmlns:a14="http://schemas.microsoft.com/office/drawing/2010/main" val="0"/>
+              </a:ext>
+            </a:extLst>
+          </a:blip>
+          <a:stretch>
+            <a:fillRect/>
+          </a:stretch>
+        </p:blipFill>
+        <p:spPr>
+          <a:xfrm>
+            <a:off x="4244278" y="1795815"/>
+            <a:ext cx="1699757" cy="1510895"/>
+          </a:xfrm>
+          <a:prstGeom prst="rect">
+            <a:avLst/>
+          </a:prstGeom>
+        </p:spPr>
+      </p:pic>
+      <p:pic>
+        <p:nvPicPr>
+          <p:cNvPr id="17" name="Рисунок 16">
+            <a:extLst>
+              <a:ext uri="{FF2B5EF4-FFF2-40B4-BE49-F238E27FC236}">
+                <a16:creationId xmlns:a16="http://schemas.microsoft.com/office/drawing/2014/main" id="{EBD76B45-969B-45AE-BE16-DCA4A3D45BC6}"/>
+              </a:ext>
+            </a:extLst>
+          </p:cNvPr>
+          <p:cNvPicPr>
+            <a:picLocks noChangeAspect="1"/>
+          </p:cNvPicPr>
+          <p:nvPr/>
+        </p:nvPicPr>
+        <p:blipFill>
+          <a:blip r:embed="rId9">
+            <a:extLst>
+              <a:ext uri="{28A0092B-C50C-407E-A947-70E740481C1C}">
+                <a14:useLocalDpi xmlns:a14="http://schemas.microsoft.com/office/drawing/2010/main" val="0"/>
+              </a:ext>
+            </a:extLst>
+          </a:blip>
+          <a:stretch>
+            <a:fillRect/>
+          </a:stretch>
+        </p:blipFill>
+        <p:spPr>
+          <a:xfrm>
+            <a:off x="6064450" y="3445007"/>
+            <a:ext cx="1681749" cy="1494888"/>
+          </a:xfrm>
+          <a:prstGeom prst="rect">
+            <a:avLst/>
+          </a:prstGeom>
+        </p:spPr>
+      </p:pic>
+      <p:pic>
+        <p:nvPicPr>
+          <p:cNvPr id="19" name="Рисунок 18">
+            <a:extLst>
+              <a:ext uri="{FF2B5EF4-FFF2-40B4-BE49-F238E27FC236}">
+                <a16:creationId xmlns:a16="http://schemas.microsoft.com/office/drawing/2014/main" id="{05ED3CBF-7A11-4657-A507-96D18A387050}"/>
+              </a:ext>
+            </a:extLst>
+          </p:cNvPr>
+          <p:cNvPicPr>
+            <a:picLocks noChangeAspect="1"/>
+          </p:cNvPicPr>
+          <p:nvPr/>
+        </p:nvPicPr>
+        <p:blipFill>
+          <a:blip r:embed="rId10">
+            <a:extLst>
+              <a:ext uri="{28A0092B-C50C-407E-A947-70E740481C1C}">
+                <a14:useLocalDpi xmlns:a14="http://schemas.microsoft.com/office/drawing/2010/main" val="0"/>
+              </a:ext>
+            </a:extLst>
+          </a:blip>
+          <a:stretch>
+            <a:fillRect/>
+          </a:stretch>
+        </p:blipFill>
+        <p:spPr>
+          <a:xfrm>
+            <a:off x="9704794" y="3517103"/>
+            <a:ext cx="1700944" cy="1511950"/>
+          </a:xfrm>
+          <a:prstGeom prst="rect">
+            <a:avLst/>
+          </a:prstGeom>
+        </p:spPr>
+      </p:pic>
+      <p:pic>
+        <p:nvPicPr>
+          <p:cNvPr id="21" name="Рисунок 20">
+            <a:extLst>
+              <a:ext uri="{FF2B5EF4-FFF2-40B4-BE49-F238E27FC236}">
+                <a16:creationId xmlns:a16="http://schemas.microsoft.com/office/drawing/2014/main" id="{B2EB5336-012D-4235-A41A-F9CE7AF03AD4}"/>
+              </a:ext>
+            </a:extLst>
+          </p:cNvPr>
+          <p:cNvPicPr>
+            <a:picLocks noChangeAspect="1"/>
+          </p:cNvPicPr>
+          <p:nvPr/>
+        </p:nvPicPr>
+        <p:blipFill>
+          <a:blip r:embed="rId11">
+            <a:extLst>
+              <a:ext uri="{28A0092B-C50C-407E-A947-70E740481C1C}">
+                <a14:useLocalDpi xmlns:a14="http://schemas.microsoft.com/office/drawing/2010/main" val="0"/>
+              </a:ext>
+            </a:extLst>
+          </a:blip>
+          <a:stretch>
+            <a:fillRect/>
+          </a:stretch>
+        </p:blipFill>
+        <p:spPr>
+          <a:xfrm>
+            <a:off x="7884622" y="3499375"/>
+            <a:ext cx="1646971" cy="1463974"/>
+          </a:xfrm>
+          <a:prstGeom prst="rect">
+            <a:avLst/>
+          </a:prstGeom>
+        </p:spPr>
+      </p:pic>
+      <p:pic>
+        <p:nvPicPr>
+          <p:cNvPr id="23" name="Рисунок 22">
+            <a:extLst>
+              <a:ext uri="{FF2B5EF4-FFF2-40B4-BE49-F238E27FC236}">
+                <a16:creationId xmlns:a16="http://schemas.microsoft.com/office/drawing/2014/main" id="{D697A2AB-D867-41D6-9901-80CBA2E92482}"/>
+              </a:ext>
+            </a:extLst>
+          </p:cNvPr>
+          <p:cNvPicPr>
+            <a:picLocks noChangeAspect="1"/>
+          </p:cNvPicPr>
+          <p:nvPr/>
+        </p:nvPicPr>
+        <p:blipFill>
+          <a:blip r:embed="rId12">
+            <a:extLst>
+              <a:ext uri="{28A0092B-C50C-407E-A947-70E740481C1C}">
+                <a14:useLocalDpi xmlns:a14="http://schemas.microsoft.com/office/drawing/2010/main" val="0"/>
+              </a:ext>
+            </a:extLst>
+          </a:blip>
+          <a:stretch>
+            <a:fillRect/>
+          </a:stretch>
+        </p:blipFill>
+        <p:spPr>
+          <a:xfrm>
+            <a:off x="9704794" y="1802511"/>
+            <a:ext cx="1700944" cy="1510895"/>
+          </a:xfrm>
+          <a:prstGeom prst="rect">
+            <a:avLst/>
+          </a:prstGeom>
+        </p:spPr>
+      </p:pic>
+      <p:pic>
+        <p:nvPicPr>
+          <p:cNvPr id="25" name="Рисунок 24">
+            <a:extLst>
+              <a:ext uri="{FF2B5EF4-FFF2-40B4-BE49-F238E27FC236}">
+                <a16:creationId xmlns:a16="http://schemas.microsoft.com/office/drawing/2014/main" id="{3D7FBD58-97D7-4133-A831-B98D37627F82}"/>
+              </a:ext>
+            </a:extLst>
+          </p:cNvPr>
+          <p:cNvPicPr>
+            <a:picLocks noChangeAspect="1"/>
+          </p:cNvPicPr>
+          <p:nvPr/>
+        </p:nvPicPr>
+        <p:blipFill>
+          <a:blip r:embed="rId13">
+            <a:extLst>
+              <a:ext uri="{28A0092B-C50C-407E-A947-70E740481C1C}">
+                <a14:useLocalDpi xmlns:a14="http://schemas.microsoft.com/office/drawing/2010/main" val="0"/>
+              </a:ext>
+            </a:extLst>
+          </a:blip>
+          <a:stretch>
+            <a:fillRect/>
+          </a:stretch>
+        </p:blipFill>
+        <p:spPr>
+          <a:xfrm>
+            <a:off x="6064450" y="1795815"/>
+            <a:ext cx="1699757" cy="1510896"/>
           </a:xfrm>
           <a:prstGeom prst="rect">
             <a:avLst/>
@@ -5281,6 +5605,252 @@
         </p:nvSpPr>
         <p:spPr>
           <a:xfrm>
+            <a:off x="3200400" y="378376"/>
+            <a:ext cx="10515600" cy="1325563"/>
+          </a:xfrm>
+        </p:spPr>
+        <p:txBody>
+          <a:bodyPr>
+            <a:normAutofit/>
+          </a:bodyPr>
+          <a:lstStyle/>
+          <a:p>
+            <a:r>
+              <a:rPr lang="ru-RU" sz="6600" b="1" dirty="0" err="1">
+                <a:ln w="13462">
+                  <a:solidFill>
+                    <a:schemeClr val="bg1"/>
+                  </a:solidFill>
+                  <a:prstDash val="solid"/>
+                </a:ln>
+                <a:solidFill>
+                  <a:schemeClr val="accent2">
+                    <a:lumMod val="50000"/>
+                  </a:schemeClr>
+                </a:solidFill>
+                <a:effectLst>
+                  <a:outerShdw dist="38100" dir="2700000" algn="bl" rotWithShape="0">
+                    <a:schemeClr val="accent5"/>
+                  </a:outerShdw>
+                </a:effectLst>
+                <a:latin typeface="+mn-lt"/>
+              </a:rPr>
+              <a:t>Платформер</a:t>
+            </a:r>
+            <a:endParaRPr lang="ru-RU" sz="6600" b="1" dirty="0">
+              <a:ln w="13462">
+                <a:solidFill>
+                  <a:schemeClr val="bg1"/>
+                </a:solidFill>
+                <a:prstDash val="solid"/>
+              </a:ln>
+              <a:solidFill>
+                <a:schemeClr val="accent2">
+                  <a:lumMod val="50000"/>
+                </a:schemeClr>
+              </a:solidFill>
+              <a:effectLst>
+                <a:outerShdw dist="38100" dir="2700000" algn="bl" rotWithShape="0">
+                  <a:schemeClr val="accent5"/>
+                </a:outerShdw>
+              </a:effectLst>
+              <a:latin typeface="+mn-lt"/>
+            </a:endParaRPr>
+          </a:p>
+        </p:txBody>
+      </p:sp>
+      <p:pic>
+        <p:nvPicPr>
+          <p:cNvPr id="6" name="Рисунок 5">
+            <a:extLst>
+              <a:ext uri="{FF2B5EF4-FFF2-40B4-BE49-F238E27FC236}">
+                <a16:creationId xmlns:a16="http://schemas.microsoft.com/office/drawing/2014/main" id="{35EDC24C-019D-4137-9217-5641D27ED5BE}"/>
+              </a:ext>
+            </a:extLst>
+          </p:cNvPr>
+          <p:cNvPicPr>
+            <a:picLocks noChangeAspect="1"/>
+          </p:cNvPicPr>
+          <p:nvPr/>
+        </p:nvPicPr>
+        <p:blipFill>
+          <a:blip r:embed="rId2">
+            <a:extLst>
+              <a:ext uri="{28A0092B-C50C-407E-A947-70E740481C1C}">
+                <a14:useLocalDpi xmlns:a14="http://schemas.microsoft.com/office/drawing/2010/main" val="0"/>
+              </a:ext>
+            </a:extLst>
+          </a:blip>
+          <a:stretch>
+            <a:fillRect/>
+          </a:stretch>
+        </p:blipFill>
+        <p:spPr>
+          <a:xfrm>
+            <a:off x="384313" y="1703939"/>
+            <a:ext cx="6498356" cy="3371022"/>
+          </a:xfrm>
+          <a:prstGeom prst="rect">
+            <a:avLst/>
+          </a:prstGeom>
+        </p:spPr>
+      </p:pic>
+      <p:pic>
+        <p:nvPicPr>
+          <p:cNvPr id="8" name="Рисунок 7">
+            <a:extLst>
+              <a:ext uri="{FF2B5EF4-FFF2-40B4-BE49-F238E27FC236}">
+                <a16:creationId xmlns:a16="http://schemas.microsoft.com/office/drawing/2014/main" id="{B718708B-AB66-4574-991D-1B13E849CF4A}"/>
+              </a:ext>
+            </a:extLst>
+          </p:cNvPr>
+          <p:cNvPicPr>
+            <a:picLocks noChangeAspect="1"/>
+          </p:cNvPicPr>
+          <p:nvPr/>
+        </p:nvPicPr>
+        <p:blipFill>
+          <a:blip r:embed="rId3">
+            <a:extLst>
+              <a:ext uri="{28A0092B-C50C-407E-A947-70E740481C1C}">
+                <a14:useLocalDpi xmlns:a14="http://schemas.microsoft.com/office/drawing/2010/main" val="0"/>
+              </a:ext>
+            </a:extLst>
+          </a:blip>
+          <a:stretch>
+            <a:fillRect/>
+          </a:stretch>
+        </p:blipFill>
+        <p:spPr>
+          <a:xfrm>
+            <a:off x="8140739" y="1826078"/>
+            <a:ext cx="634921" cy="634921"/>
+          </a:xfrm>
+          <a:prstGeom prst="rect">
+            <a:avLst/>
+          </a:prstGeom>
+        </p:spPr>
+      </p:pic>
+      <p:pic>
+        <p:nvPicPr>
+          <p:cNvPr id="10" name="Рисунок 9">
+            <a:extLst>
+              <a:ext uri="{FF2B5EF4-FFF2-40B4-BE49-F238E27FC236}">
+                <a16:creationId xmlns:a16="http://schemas.microsoft.com/office/drawing/2014/main" id="{8A812729-0E56-480C-9A68-5420D1298A2B}"/>
+              </a:ext>
+            </a:extLst>
+          </p:cNvPr>
+          <p:cNvPicPr>
+            <a:picLocks noChangeAspect="1"/>
+          </p:cNvPicPr>
+          <p:nvPr/>
+        </p:nvPicPr>
+        <p:blipFill>
+          <a:blip r:embed="rId4">
+            <a:extLst>
+              <a:ext uri="{28A0092B-C50C-407E-A947-70E740481C1C}">
+                <a14:useLocalDpi xmlns:a14="http://schemas.microsoft.com/office/drawing/2010/main" val="0"/>
+              </a:ext>
+            </a:extLst>
+          </a:blip>
+          <a:stretch>
+            <a:fillRect/>
+          </a:stretch>
+        </p:blipFill>
+        <p:spPr>
+          <a:xfrm>
+            <a:off x="9061373" y="2544890"/>
+            <a:ext cx="560570" cy="467140"/>
+          </a:xfrm>
+          <a:prstGeom prst="rect">
+            <a:avLst/>
+          </a:prstGeom>
+        </p:spPr>
+      </p:pic>
+      <p:pic>
+        <p:nvPicPr>
+          <p:cNvPr id="12" name="Рисунок 11">
+            <a:extLst>
+              <a:ext uri="{FF2B5EF4-FFF2-40B4-BE49-F238E27FC236}">
+                <a16:creationId xmlns:a16="http://schemas.microsoft.com/office/drawing/2014/main" id="{75416DA5-B202-4D96-8189-B55FBB5D8FD5}"/>
+              </a:ext>
+            </a:extLst>
+          </p:cNvPr>
+          <p:cNvPicPr>
+            <a:picLocks noChangeAspect="1"/>
+          </p:cNvPicPr>
+          <p:nvPr/>
+        </p:nvPicPr>
+        <p:blipFill>
+          <a:blip r:embed="rId5">
+            <a:extLst>
+              <a:ext uri="{28A0092B-C50C-407E-A947-70E740481C1C}">
+                <a14:useLocalDpi xmlns:a14="http://schemas.microsoft.com/office/drawing/2010/main" val="0"/>
+              </a:ext>
+            </a:extLst>
+          </a:blip>
+          <a:stretch>
+            <a:fillRect/>
+          </a:stretch>
+        </p:blipFill>
+        <p:spPr>
+          <a:xfrm>
+            <a:off x="8071817" y="3301950"/>
+            <a:ext cx="2539682" cy="1015873"/>
+          </a:xfrm>
+          <a:prstGeom prst="rect">
+            <a:avLst/>
+          </a:prstGeom>
+        </p:spPr>
+      </p:pic>
+    </p:spTree>
+    <p:extLst>
+      <p:ext uri="{BB962C8B-B14F-4D97-AF65-F5344CB8AC3E}">
+        <p14:creationId xmlns:p14="http://schemas.microsoft.com/office/powerpoint/2010/main" val="2955943707"/>
+      </p:ext>
+    </p:extLst>
+  </p:cSld>
+  <p:clrMapOvr>
+    <a:masterClrMapping/>
+  </p:clrMapOvr>
+</p:sld>
+</file>
+
+<file path=ppt/slides/slide4.xml><?xml version="1.0" encoding="utf-8"?>
+<p:sld xmlns:a="http://schemas.openxmlformats.org/drawingml/2006/main" xmlns:r="http://schemas.openxmlformats.org/officeDocument/2006/relationships" xmlns:p="http://schemas.openxmlformats.org/presentationml/2006/main">
+  <p:cSld>
+    <p:spTree>
+      <p:nvGrpSpPr>
+        <p:cNvPr id="1" name=""/>
+        <p:cNvGrpSpPr/>
+        <p:nvPr/>
+      </p:nvGrpSpPr>
+      <p:grpSpPr>
+        <a:xfrm>
+          <a:off x="0" y="0"/>
+          <a:ext cx="0" cy="0"/>
+          <a:chOff x="0" y="0"/>
+          <a:chExt cx="0" cy="0"/>
+        </a:xfrm>
+      </p:grpSpPr>
+      <p:sp>
+        <p:nvSpPr>
+          <p:cNvPr id="3" name="Заголовок 1">
+            <a:extLst>
+              <a:ext uri="{FF2B5EF4-FFF2-40B4-BE49-F238E27FC236}">
+                <a16:creationId xmlns:a16="http://schemas.microsoft.com/office/drawing/2014/main" id="{702423D9-40DE-4A3A-AEFC-CFEEDF2E3DDB}"/>
+              </a:ext>
+            </a:extLst>
+          </p:cNvPr>
+          <p:cNvSpPr>
+            <a:spLocks noGrp="1"/>
+          </p:cNvSpPr>
+          <p:nvPr>
+            <p:ph type="title"/>
+          </p:nvPr>
+        </p:nvSpPr>
+        <p:spPr>
+          <a:xfrm>
             <a:off x="3558209" y="192847"/>
             <a:ext cx="10515600" cy="1325563"/>
           </a:xfrm>
@@ -5466,252 +6036,6 @@
     <p:extLst>
       <p:ext uri="{BB962C8B-B14F-4D97-AF65-F5344CB8AC3E}">
         <p14:creationId xmlns:p14="http://schemas.microsoft.com/office/powerpoint/2010/main" val="2408183385"/>
-      </p:ext>
-    </p:extLst>
-  </p:cSld>
-  <p:clrMapOvr>
-    <a:masterClrMapping/>
-  </p:clrMapOvr>
-</p:sld>
-</file>
-
-<file path=ppt/slides/slide4.xml><?xml version="1.0" encoding="utf-8"?>
-<p:sld xmlns:a="http://schemas.openxmlformats.org/drawingml/2006/main" xmlns:r="http://schemas.openxmlformats.org/officeDocument/2006/relationships" xmlns:p="http://schemas.openxmlformats.org/presentationml/2006/main">
-  <p:cSld>
-    <p:spTree>
-      <p:nvGrpSpPr>
-        <p:cNvPr id="1" name=""/>
-        <p:cNvGrpSpPr/>
-        <p:nvPr/>
-      </p:nvGrpSpPr>
-      <p:grpSpPr>
-        <a:xfrm>
-          <a:off x="0" y="0"/>
-          <a:ext cx="0" cy="0"/>
-          <a:chOff x="0" y="0"/>
-          <a:chExt cx="0" cy="0"/>
-        </a:xfrm>
-      </p:grpSpPr>
-      <p:sp>
-        <p:nvSpPr>
-          <p:cNvPr id="3" name="Заголовок 1">
-            <a:extLst>
-              <a:ext uri="{FF2B5EF4-FFF2-40B4-BE49-F238E27FC236}">
-                <a16:creationId xmlns:a16="http://schemas.microsoft.com/office/drawing/2014/main" id="{702423D9-40DE-4A3A-AEFC-CFEEDF2E3DDB}"/>
-              </a:ext>
-            </a:extLst>
-          </p:cNvPr>
-          <p:cNvSpPr>
-            <a:spLocks noGrp="1"/>
-          </p:cNvSpPr>
-          <p:nvPr>
-            <p:ph type="title"/>
-          </p:nvPr>
-        </p:nvSpPr>
-        <p:spPr>
-          <a:xfrm>
-            <a:off x="3200400" y="378376"/>
-            <a:ext cx="10515600" cy="1325563"/>
-          </a:xfrm>
-        </p:spPr>
-        <p:txBody>
-          <a:bodyPr>
-            <a:normAutofit/>
-          </a:bodyPr>
-          <a:lstStyle/>
-          <a:p>
-            <a:r>
-              <a:rPr lang="ru-RU" sz="6600" b="1" dirty="0" err="1">
-                <a:ln w="13462">
-                  <a:solidFill>
-                    <a:schemeClr val="bg1"/>
-                  </a:solidFill>
-                  <a:prstDash val="solid"/>
-                </a:ln>
-                <a:solidFill>
-                  <a:schemeClr val="accent2">
-                    <a:lumMod val="50000"/>
-                  </a:schemeClr>
-                </a:solidFill>
-                <a:effectLst>
-                  <a:outerShdw dist="38100" dir="2700000" algn="bl" rotWithShape="0">
-                    <a:schemeClr val="accent5"/>
-                  </a:outerShdw>
-                </a:effectLst>
-                <a:latin typeface="+mn-lt"/>
-              </a:rPr>
-              <a:t>Платформер</a:t>
-            </a:r>
-            <a:endParaRPr lang="ru-RU" sz="6600" b="1" dirty="0">
-              <a:ln w="13462">
-                <a:solidFill>
-                  <a:schemeClr val="bg1"/>
-                </a:solidFill>
-                <a:prstDash val="solid"/>
-              </a:ln>
-              <a:solidFill>
-                <a:schemeClr val="accent2">
-                  <a:lumMod val="50000"/>
-                </a:schemeClr>
-              </a:solidFill>
-              <a:effectLst>
-                <a:outerShdw dist="38100" dir="2700000" algn="bl" rotWithShape="0">
-                  <a:schemeClr val="accent5"/>
-                </a:outerShdw>
-              </a:effectLst>
-              <a:latin typeface="+mn-lt"/>
-            </a:endParaRPr>
-          </a:p>
-        </p:txBody>
-      </p:sp>
-      <p:pic>
-        <p:nvPicPr>
-          <p:cNvPr id="6" name="Рисунок 5">
-            <a:extLst>
-              <a:ext uri="{FF2B5EF4-FFF2-40B4-BE49-F238E27FC236}">
-                <a16:creationId xmlns:a16="http://schemas.microsoft.com/office/drawing/2014/main" id="{35EDC24C-019D-4137-9217-5641D27ED5BE}"/>
-              </a:ext>
-            </a:extLst>
-          </p:cNvPr>
-          <p:cNvPicPr>
-            <a:picLocks noChangeAspect="1"/>
-          </p:cNvPicPr>
-          <p:nvPr/>
-        </p:nvPicPr>
-        <p:blipFill>
-          <a:blip r:embed="rId2">
-            <a:extLst>
-              <a:ext uri="{28A0092B-C50C-407E-A947-70E740481C1C}">
-                <a14:useLocalDpi xmlns:a14="http://schemas.microsoft.com/office/drawing/2010/main" val="0"/>
-              </a:ext>
-            </a:extLst>
-          </a:blip>
-          <a:stretch>
-            <a:fillRect/>
-          </a:stretch>
-        </p:blipFill>
-        <p:spPr>
-          <a:xfrm>
-            <a:off x="384313" y="1703939"/>
-            <a:ext cx="6498356" cy="3371022"/>
-          </a:xfrm>
-          <a:prstGeom prst="rect">
-            <a:avLst/>
-          </a:prstGeom>
-        </p:spPr>
-      </p:pic>
-      <p:pic>
-        <p:nvPicPr>
-          <p:cNvPr id="8" name="Рисунок 7">
-            <a:extLst>
-              <a:ext uri="{FF2B5EF4-FFF2-40B4-BE49-F238E27FC236}">
-                <a16:creationId xmlns:a16="http://schemas.microsoft.com/office/drawing/2014/main" id="{B718708B-AB66-4574-991D-1B13E849CF4A}"/>
-              </a:ext>
-            </a:extLst>
-          </p:cNvPr>
-          <p:cNvPicPr>
-            <a:picLocks noChangeAspect="1"/>
-          </p:cNvPicPr>
-          <p:nvPr/>
-        </p:nvPicPr>
-        <p:blipFill>
-          <a:blip r:embed="rId3">
-            <a:extLst>
-              <a:ext uri="{28A0092B-C50C-407E-A947-70E740481C1C}">
-                <a14:useLocalDpi xmlns:a14="http://schemas.microsoft.com/office/drawing/2010/main" val="0"/>
-              </a:ext>
-            </a:extLst>
-          </a:blip>
-          <a:stretch>
-            <a:fillRect/>
-          </a:stretch>
-        </p:blipFill>
-        <p:spPr>
-          <a:xfrm>
-            <a:off x="8140739" y="1826078"/>
-            <a:ext cx="634921" cy="634921"/>
-          </a:xfrm>
-          <a:prstGeom prst="rect">
-            <a:avLst/>
-          </a:prstGeom>
-        </p:spPr>
-      </p:pic>
-      <p:pic>
-        <p:nvPicPr>
-          <p:cNvPr id="10" name="Рисунок 9">
-            <a:extLst>
-              <a:ext uri="{FF2B5EF4-FFF2-40B4-BE49-F238E27FC236}">
-                <a16:creationId xmlns:a16="http://schemas.microsoft.com/office/drawing/2014/main" id="{8A812729-0E56-480C-9A68-5420D1298A2B}"/>
-              </a:ext>
-            </a:extLst>
-          </p:cNvPr>
-          <p:cNvPicPr>
-            <a:picLocks noChangeAspect="1"/>
-          </p:cNvPicPr>
-          <p:nvPr/>
-        </p:nvPicPr>
-        <p:blipFill>
-          <a:blip r:embed="rId4">
-            <a:extLst>
-              <a:ext uri="{28A0092B-C50C-407E-A947-70E740481C1C}">
-                <a14:useLocalDpi xmlns:a14="http://schemas.microsoft.com/office/drawing/2010/main" val="0"/>
-              </a:ext>
-            </a:extLst>
-          </a:blip>
-          <a:stretch>
-            <a:fillRect/>
-          </a:stretch>
-        </p:blipFill>
-        <p:spPr>
-          <a:xfrm>
-            <a:off x="9061373" y="2544890"/>
-            <a:ext cx="560570" cy="467140"/>
-          </a:xfrm>
-          <a:prstGeom prst="rect">
-            <a:avLst/>
-          </a:prstGeom>
-        </p:spPr>
-      </p:pic>
-      <p:pic>
-        <p:nvPicPr>
-          <p:cNvPr id="12" name="Рисунок 11">
-            <a:extLst>
-              <a:ext uri="{FF2B5EF4-FFF2-40B4-BE49-F238E27FC236}">
-                <a16:creationId xmlns:a16="http://schemas.microsoft.com/office/drawing/2014/main" id="{75416DA5-B202-4D96-8189-B55FBB5D8FD5}"/>
-              </a:ext>
-            </a:extLst>
-          </p:cNvPr>
-          <p:cNvPicPr>
-            <a:picLocks noChangeAspect="1"/>
-          </p:cNvPicPr>
-          <p:nvPr/>
-        </p:nvPicPr>
-        <p:blipFill>
-          <a:blip r:embed="rId5">
-            <a:extLst>
-              <a:ext uri="{28A0092B-C50C-407E-A947-70E740481C1C}">
-                <a14:useLocalDpi xmlns:a14="http://schemas.microsoft.com/office/drawing/2010/main" val="0"/>
-              </a:ext>
-            </a:extLst>
-          </a:blip>
-          <a:stretch>
-            <a:fillRect/>
-          </a:stretch>
-        </p:blipFill>
-        <p:spPr>
-          <a:xfrm>
-            <a:off x="8071817" y="3301950"/>
-            <a:ext cx="2539682" cy="1015873"/>
-          </a:xfrm>
-          <a:prstGeom prst="rect">
-            <a:avLst/>
-          </a:prstGeom>
-        </p:spPr>
-      </p:pic>
-    </p:spTree>
-    <p:extLst>
-      <p:ext uri="{BB962C8B-B14F-4D97-AF65-F5344CB8AC3E}">
-        <p14:creationId xmlns:p14="http://schemas.microsoft.com/office/powerpoint/2010/main" val="2955943707"/>
       </p:ext>
     </p:extLst>
   </p:cSld>

</xml_diff>